<commit_message>
added module in requirements
</commit_message>
<xml_diff>
--- a/sample.pptx
+++ b/sample.pptx
@@ -208,7 +208,7 @@
           <a:p>
             <a:fld id="{5D2A3E32-B134-42CF-BF99-9DCA3D02EB99}" type="datetimeFigureOut">
               <a:rPr lang="en-US" smtClean="0"/>
-              <a:t>10/26/2025</a:t>
+              <a:t>11/12/2025</a:t>
             </a:fld>
             <a:endParaRPr lang="en-US"/>
           </a:p>
@@ -655,7 +655,7 @@
             <a:fld id="{1D8BD707-D9CF-40AE-B4C6-C98DA3205C09}" type="datetimeFigureOut">
               <a:rPr lang="en-US" smtClean="0"/>
               <a:pPr/>
-              <a:t>10/26/2025</a:t>
+              <a:t>11/12/2025</a:t>
             </a:fld>
             <a:endParaRPr lang="en-US"/>
           </a:p>
@@ -820,7 +820,7 @@
             <a:fld id="{1D8BD707-D9CF-40AE-B4C6-C98DA3205C09}" type="datetimeFigureOut">
               <a:rPr lang="en-US" smtClean="0"/>
               <a:pPr/>
-              <a:t>10/26/2025</a:t>
+              <a:t>11/12/2025</a:t>
             </a:fld>
             <a:endParaRPr lang="en-US"/>
           </a:p>
@@ -995,7 +995,7 @@
             <a:fld id="{1D8BD707-D9CF-40AE-B4C6-C98DA3205C09}" type="datetimeFigureOut">
               <a:rPr lang="en-US" smtClean="0"/>
               <a:pPr/>
-              <a:t>10/26/2025</a:t>
+              <a:t>11/12/2025</a:t>
             </a:fld>
             <a:endParaRPr lang="en-US"/>
           </a:p>
@@ -1160,7 +1160,7 @@
             <a:fld id="{1D8BD707-D9CF-40AE-B4C6-C98DA3205C09}" type="datetimeFigureOut">
               <a:rPr lang="en-US" smtClean="0"/>
               <a:pPr/>
-              <a:t>10/26/2025</a:t>
+              <a:t>11/12/2025</a:t>
             </a:fld>
             <a:endParaRPr lang="en-US"/>
           </a:p>
@@ -1402,7 +1402,7 @@
             <a:fld id="{1D8BD707-D9CF-40AE-B4C6-C98DA3205C09}" type="datetimeFigureOut">
               <a:rPr lang="en-US" smtClean="0"/>
               <a:pPr/>
-              <a:t>10/26/2025</a:t>
+              <a:t>11/12/2025</a:t>
             </a:fld>
             <a:endParaRPr lang="en-US"/>
           </a:p>
@@ -1684,7 +1684,7 @@
             <a:fld id="{1D8BD707-D9CF-40AE-B4C6-C98DA3205C09}" type="datetimeFigureOut">
               <a:rPr lang="en-US" smtClean="0"/>
               <a:pPr/>
-              <a:t>10/26/2025</a:t>
+              <a:t>11/12/2025</a:t>
             </a:fld>
             <a:endParaRPr lang="en-US"/>
           </a:p>
@@ -2100,7 +2100,7 @@
             <a:fld id="{1D8BD707-D9CF-40AE-B4C6-C98DA3205C09}" type="datetimeFigureOut">
               <a:rPr lang="en-US" smtClean="0"/>
               <a:pPr/>
-              <a:t>10/26/2025</a:t>
+              <a:t>11/12/2025</a:t>
             </a:fld>
             <a:endParaRPr lang="en-US"/>
           </a:p>
@@ -2214,7 +2214,7 @@
             <a:fld id="{1D8BD707-D9CF-40AE-B4C6-C98DA3205C09}" type="datetimeFigureOut">
               <a:rPr lang="en-US" smtClean="0"/>
               <a:pPr/>
-              <a:t>10/26/2025</a:t>
+              <a:t>11/12/2025</a:t>
             </a:fld>
             <a:endParaRPr lang="en-US"/>
           </a:p>
@@ -2306,7 +2306,7 @@
             <a:fld id="{1D8BD707-D9CF-40AE-B4C6-C98DA3205C09}" type="datetimeFigureOut">
               <a:rPr lang="en-US" smtClean="0"/>
               <a:pPr/>
-              <a:t>10/26/2025</a:t>
+              <a:t>11/12/2025</a:t>
             </a:fld>
             <a:endParaRPr lang="en-US"/>
           </a:p>
@@ -2578,7 +2578,7 @@
             <a:fld id="{1D8BD707-D9CF-40AE-B4C6-C98DA3205C09}" type="datetimeFigureOut">
               <a:rPr lang="en-US" smtClean="0"/>
               <a:pPr/>
-              <a:t>10/26/2025</a:t>
+              <a:t>11/12/2025</a:t>
             </a:fld>
             <a:endParaRPr lang="en-US"/>
           </a:p>
@@ -2827,7 +2827,7 @@
             <a:fld id="{1D8BD707-D9CF-40AE-B4C6-C98DA3205C09}" type="datetimeFigureOut">
               <a:rPr lang="en-US" smtClean="0"/>
               <a:pPr/>
-              <a:t>10/26/2025</a:t>
+              <a:t>11/12/2025</a:t>
             </a:fld>
             <a:endParaRPr lang="en-US"/>
           </a:p>
@@ -3035,7 +3035,7 @@
             <a:fld id="{1D8BD707-D9CF-40AE-B4C6-C98DA3205C09}" type="datetimeFigureOut">
               <a:rPr lang="en-US" smtClean="0"/>
               <a:pPr/>
-              <a:t>10/26/2025</a:t>
+              <a:t>11/12/2025</a:t>
             </a:fld>
             <a:endParaRPr lang="en-US"/>
           </a:p>
@@ -4555,6 +4555,42 @@
           </a:p>
         </p:txBody>
       </p:sp>
+      <p:pic>
+        <p:nvPicPr>
+          <p:cNvPr id="15" name="Picture 14" descr="A black background with writing&#10;&#10;AI-generated content may be incorrect.">
+            <a:extLst>
+              <a:ext uri="{FF2B5EF4-FFF2-40B4-BE49-F238E27FC236}">
+                <a16:creationId xmlns:a16="http://schemas.microsoft.com/office/drawing/2014/main" id="{64FB93F1-5B7A-8410-A2E7-E32521A26345}"/>
+              </a:ext>
+            </a:extLst>
+          </p:cNvPr>
+          <p:cNvPicPr>
+            <a:picLocks noChangeAspect="1"/>
+          </p:cNvPicPr>
+          <p:nvPr/>
+        </p:nvPicPr>
+        <p:blipFill>
+          <a:blip r:embed="rId12" cstate="print">
+            <a:extLst>
+              <a:ext uri="{28A0092B-C50C-407E-A947-70E740481C1C}">
+                <a14:useLocalDpi xmlns:a14="http://schemas.microsoft.com/office/drawing/2010/main" val="0"/>
+              </a:ext>
+            </a:extLst>
+          </a:blip>
+          <a:stretch>
+            <a:fillRect/>
+          </a:stretch>
+        </p:blipFill>
+        <p:spPr>
+          <a:xfrm>
+            <a:off x="8229600" y="5388644"/>
+            <a:ext cx="847356" cy="635459"/>
+          </a:xfrm>
+          <a:prstGeom prst="rect">
+            <a:avLst/>
+          </a:prstGeom>
+        </p:spPr>
+      </p:pic>
       <p:sp>
         <p:nvSpPr>
           <p:cNvPr id="46" name="TextBox 45"/>
@@ -4584,7 +4620,7 @@
               </a:defRPr>
             </a:pPr>
             <a:r>
-              <a:t>A. K. M Mahmud - Ul - Hasan</a:t>
+              <a:t>A. F. M. Mohaimen Khan</a:t>
             </a:r>
           </a:p>
         </p:txBody>

</xml_diff>